<commit_message>
Image of the pipeline is done
</commit_message>
<xml_diff>
--- a/DataLineage.pptx
+++ b/DataLineage.pptx
@@ -2,13 +2,13 @@
 <file path=ppt/presentation.xml><?xml version="1.0" encoding="utf-8"?>
 <p:presentation xmlns:a="http://schemas.openxmlformats.org/drawingml/2006/main" xmlns:r="http://schemas.openxmlformats.org/officeDocument/2006/relationships" xmlns:p="http://schemas.openxmlformats.org/presentationml/2006/main" saveSubsetFonts="1">
   <p:sldMasterIdLst>
-    <p:sldMasterId id="2147483660" r:id="rId1"/>
+    <p:sldMasterId id="2147483672" r:id="rId1"/>
   </p:sldMasterIdLst>
   <p:sldIdLst>
     <p:sldId id="256" r:id="rId2"/>
   </p:sldIdLst>
-  <p:sldSz cx="21336000" cy="13716000"/>
-  <p:notesSz cx="6858000" cy="9144000"/>
+  <p:sldSz cx="27432000" cy="27432000"/>
+  <p:notesSz cx="9144000" cy="6858000"/>
   <p:defaultTextStyle>
     <a:defPPr>
       <a:defRPr lang="en-US"/>
@@ -562,15 +562,15 @@
         </p:nvSpPr>
         <p:spPr>
           <a:xfrm>
-            <a:off x="2667000" y="2244726"/>
-            <a:ext cx="16002000" cy="4775200"/>
+            <a:off x="2057400" y="4489452"/>
+            <a:ext cx="23317200" cy="9550400"/>
           </a:xfrm>
         </p:spPr>
         <p:txBody>
           <a:bodyPr anchor="b"/>
           <a:lstStyle>
             <a:lvl1pPr algn="ctr">
-              <a:defRPr sz="10500"/>
+              <a:defRPr sz="18000"/>
             </a:lvl1pPr>
           </a:lstStyle>
           <a:p>
@@ -594,8 +594,8 @@
         </p:nvSpPr>
         <p:spPr>
           <a:xfrm>
-            <a:off x="2667000" y="7204076"/>
-            <a:ext cx="16002000" cy="3311524"/>
+            <a:off x="3429000" y="14408152"/>
+            <a:ext cx="20574000" cy="6623048"/>
           </a:xfrm>
         </p:spPr>
         <p:txBody>
@@ -603,39 +603,39 @@
           <a:lstStyle>
             <a:lvl1pPr marL="0" indent="0" algn="ctr">
               <a:buNone/>
-              <a:defRPr sz="4200"/>
+              <a:defRPr sz="7200"/>
             </a:lvl1pPr>
-            <a:lvl2pPr marL="800100" indent="0" algn="ctr">
+            <a:lvl2pPr marL="1371600" indent="0" algn="ctr">
               <a:buNone/>
-              <a:defRPr sz="3500"/>
+              <a:defRPr sz="6000"/>
             </a:lvl2pPr>
-            <a:lvl3pPr marL="1600200" indent="0" algn="ctr">
+            <a:lvl3pPr marL="2743200" indent="0" algn="ctr">
               <a:buNone/>
-              <a:defRPr sz="3150"/>
+              <a:defRPr sz="5400"/>
             </a:lvl3pPr>
-            <a:lvl4pPr marL="2400300" indent="0" algn="ctr">
+            <a:lvl4pPr marL="4114800" indent="0" algn="ctr">
               <a:buNone/>
-              <a:defRPr sz="2800"/>
+              <a:defRPr sz="4800"/>
             </a:lvl4pPr>
-            <a:lvl5pPr marL="3200400" indent="0" algn="ctr">
+            <a:lvl5pPr marL="5486400" indent="0" algn="ctr">
               <a:buNone/>
-              <a:defRPr sz="2800"/>
+              <a:defRPr sz="4800"/>
             </a:lvl5pPr>
-            <a:lvl6pPr marL="4000500" indent="0" algn="ctr">
+            <a:lvl6pPr marL="6858000" indent="0" algn="ctr">
               <a:buNone/>
-              <a:defRPr sz="2800"/>
+              <a:defRPr sz="4800"/>
             </a:lvl6pPr>
-            <a:lvl7pPr marL="4800600" indent="0" algn="ctr">
+            <a:lvl7pPr marL="8229600" indent="0" algn="ctr">
               <a:buNone/>
-              <a:defRPr sz="2800"/>
+              <a:defRPr sz="4800"/>
             </a:lvl7pPr>
-            <a:lvl8pPr marL="5600700" indent="0" algn="ctr">
+            <a:lvl8pPr marL="9601200" indent="0" algn="ctr">
               <a:buNone/>
-              <a:defRPr sz="2800"/>
+              <a:defRPr sz="4800"/>
             </a:lvl8pPr>
-            <a:lvl9pPr marL="6400800" indent="0" algn="ctr">
+            <a:lvl9pPr marL="10972800" indent="0" algn="ctr">
               <a:buNone/>
-              <a:defRPr sz="2800"/>
+              <a:defRPr sz="4800"/>
             </a:lvl9pPr>
           </a:lstStyle>
           <a:p>
@@ -664,7 +664,7 @@
           <a:p>
             <a:fld id="{BD61937F-DF06-45E9-9EBC-D5170D9BB498}" type="datetimeFigureOut">
               <a:rPr lang="en-US" smtClean="0"/>
-              <a:t>3/12/2024</a:t>
+              <a:t>6/10/2024</a:t>
             </a:fld>
             <a:endParaRPr lang="en-US"/>
           </a:p>
@@ -715,7 +715,7 @@
     </p:spTree>
     <p:extLst>
       <p:ext uri="{BB962C8B-B14F-4D97-AF65-F5344CB8AC3E}">
-        <p14:creationId xmlns:p14="http://schemas.microsoft.com/office/powerpoint/2010/main" val="2974914836"/>
+        <p14:creationId xmlns:p14="http://schemas.microsoft.com/office/powerpoint/2010/main" val="2107556709"/>
       </p:ext>
     </p:extLst>
   </p:cSld>
@@ -834,7 +834,7 @@
           <a:p>
             <a:fld id="{BD61937F-DF06-45E9-9EBC-D5170D9BB498}" type="datetimeFigureOut">
               <a:rPr lang="en-US" smtClean="0"/>
-              <a:t>3/12/2024</a:t>
+              <a:t>6/10/2024</a:t>
             </a:fld>
             <a:endParaRPr lang="en-US"/>
           </a:p>
@@ -885,7 +885,7 @@
     </p:spTree>
     <p:extLst>
       <p:ext uri="{BB962C8B-B14F-4D97-AF65-F5344CB8AC3E}">
-        <p14:creationId xmlns:p14="http://schemas.microsoft.com/office/powerpoint/2010/main" val="3930973401"/>
+        <p14:creationId xmlns:p14="http://schemas.microsoft.com/office/powerpoint/2010/main" val="3594480054"/>
       </p:ext>
     </p:extLst>
   </p:cSld>
@@ -924,8 +924,8 @@
         </p:nvSpPr>
         <p:spPr>
           <a:xfrm>
-            <a:off x="15268575" y="730250"/>
-            <a:ext cx="4600575" cy="11623676"/>
+            <a:off x="19631027" y="1460500"/>
+            <a:ext cx="5915025" cy="23247352"/>
           </a:xfrm>
         </p:spPr>
         <p:txBody>
@@ -952,8 +952,8 @@
         </p:nvSpPr>
         <p:spPr>
           <a:xfrm>
-            <a:off x="1466850" y="730250"/>
-            <a:ext cx="13535025" cy="11623676"/>
+            <a:off x="1885952" y="1460500"/>
+            <a:ext cx="17402175" cy="23247352"/>
           </a:xfrm>
         </p:spPr>
         <p:txBody>
@@ -1014,7 +1014,7 @@
           <a:p>
             <a:fld id="{BD61937F-DF06-45E9-9EBC-D5170D9BB498}" type="datetimeFigureOut">
               <a:rPr lang="en-US" smtClean="0"/>
-              <a:t>3/12/2024</a:t>
+              <a:t>6/10/2024</a:t>
             </a:fld>
             <a:endParaRPr lang="en-US"/>
           </a:p>
@@ -1065,7 +1065,7 @@
     </p:spTree>
     <p:extLst>
       <p:ext uri="{BB962C8B-B14F-4D97-AF65-F5344CB8AC3E}">
-        <p14:creationId xmlns:p14="http://schemas.microsoft.com/office/powerpoint/2010/main" val="973536933"/>
+        <p14:creationId xmlns:p14="http://schemas.microsoft.com/office/powerpoint/2010/main" val="95867585"/>
       </p:ext>
     </p:extLst>
   </p:cSld>
@@ -1184,7 +1184,7 @@
           <a:p>
             <a:fld id="{BD61937F-DF06-45E9-9EBC-D5170D9BB498}" type="datetimeFigureOut">
               <a:rPr lang="en-US" smtClean="0"/>
-              <a:t>3/12/2024</a:t>
+              <a:t>6/10/2024</a:t>
             </a:fld>
             <a:endParaRPr lang="en-US"/>
           </a:p>
@@ -1235,7 +1235,7 @@
     </p:spTree>
     <p:extLst>
       <p:ext uri="{BB962C8B-B14F-4D97-AF65-F5344CB8AC3E}">
-        <p14:creationId xmlns:p14="http://schemas.microsoft.com/office/powerpoint/2010/main" val="1010872489"/>
+        <p14:creationId xmlns:p14="http://schemas.microsoft.com/office/powerpoint/2010/main" val="3950173840"/>
       </p:ext>
     </p:extLst>
   </p:cSld>
@@ -1274,15 +1274,15 @@
         </p:nvSpPr>
         <p:spPr>
           <a:xfrm>
-            <a:off x="1455738" y="3419477"/>
-            <a:ext cx="18402300" cy="5705474"/>
+            <a:off x="1871664" y="6838958"/>
+            <a:ext cx="23660100" cy="11410948"/>
           </a:xfrm>
         </p:spPr>
         <p:txBody>
           <a:bodyPr anchor="b"/>
           <a:lstStyle>
             <a:lvl1pPr>
-              <a:defRPr sz="10500"/>
+              <a:defRPr sz="18000"/>
             </a:lvl1pPr>
           </a:lstStyle>
           <a:p>
@@ -1306,8 +1306,8 @@
         </p:nvSpPr>
         <p:spPr>
           <a:xfrm>
-            <a:off x="1455738" y="9178927"/>
-            <a:ext cx="18402300" cy="3000374"/>
+            <a:off x="1871664" y="18357858"/>
+            <a:ext cx="23660100" cy="6000748"/>
           </a:xfrm>
         </p:spPr>
         <p:txBody>
@@ -1315,17 +1315,15 @@
           <a:lstStyle>
             <a:lvl1pPr marL="0" indent="0">
               <a:buNone/>
-              <a:defRPr sz="4200">
+              <a:defRPr sz="7200">
                 <a:solidFill>
-                  <a:schemeClr val="tx1">
-                    <a:tint val="75000"/>
-                  </a:schemeClr>
+                  <a:schemeClr val="tx1"/>
                 </a:solidFill>
               </a:defRPr>
             </a:lvl1pPr>
-            <a:lvl2pPr marL="800100" indent="0">
+            <a:lvl2pPr marL="1371600" indent="0">
               <a:buNone/>
-              <a:defRPr sz="3500">
+              <a:defRPr sz="6000">
                 <a:solidFill>
                   <a:schemeClr val="tx1">
                     <a:tint val="75000"/>
@@ -1333,9 +1331,9 @@
                 </a:solidFill>
               </a:defRPr>
             </a:lvl2pPr>
-            <a:lvl3pPr marL="1600200" indent="0">
+            <a:lvl3pPr marL="2743200" indent="0">
               <a:buNone/>
-              <a:defRPr sz="3150">
+              <a:defRPr sz="5400">
                 <a:solidFill>
                   <a:schemeClr val="tx1">
                     <a:tint val="75000"/>
@@ -1343,9 +1341,9 @@
                 </a:solidFill>
               </a:defRPr>
             </a:lvl3pPr>
-            <a:lvl4pPr marL="2400300" indent="0">
+            <a:lvl4pPr marL="4114800" indent="0">
               <a:buNone/>
-              <a:defRPr sz="2800">
+              <a:defRPr sz="4800">
                 <a:solidFill>
                   <a:schemeClr val="tx1">
                     <a:tint val="75000"/>
@@ -1353,9 +1351,9 @@
                 </a:solidFill>
               </a:defRPr>
             </a:lvl4pPr>
-            <a:lvl5pPr marL="3200400" indent="0">
+            <a:lvl5pPr marL="5486400" indent="0">
               <a:buNone/>
-              <a:defRPr sz="2800">
+              <a:defRPr sz="4800">
                 <a:solidFill>
                   <a:schemeClr val="tx1">
                     <a:tint val="75000"/>
@@ -1363,9 +1361,9 @@
                 </a:solidFill>
               </a:defRPr>
             </a:lvl5pPr>
-            <a:lvl6pPr marL="4000500" indent="0">
+            <a:lvl6pPr marL="6858000" indent="0">
               <a:buNone/>
-              <a:defRPr sz="2800">
+              <a:defRPr sz="4800">
                 <a:solidFill>
                   <a:schemeClr val="tx1">
                     <a:tint val="75000"/>
@@ -1373,9 +1371,9 @@
                 </a:solidFill>
               </a:defRPr>
             </a:lvl6pPr>
-            <a:lvl7pPr marL="4800600" indent="0">
+            <a:lvl7pPr marL="8229600" indent="0">
               <a:buNone/>
-              <a:defRPr sz="2800">
+              <a:defRPr sz="4800">
                 <a:solidFill>
                   <a:schemeClr val="tx1">
                     <a:tint val="75000"/>
@@ -1383,9 +1381,9 @@
                 </a:solidFill>
               </a:defRPr>
             </a:lvl7pPr>
-            <a:lvl8pPr marL="5600700" indent="0">
+            <a:lvl8pPr marL="9601200" indent="0">
               <a:buNone/>
-              <a:defRPr sz="2800">
+              <a:defRPr sz="4800">
                 <a:solidFill>
                   <a:schemeClr val="tx1">
                     <a:tint val="75000"/>
@@ -1393,9 +1391,9 @@
                 </a:solidFill>
               </a:defRPr>
             </a:lvl8pPr>
-            <a:lvl9pPr marL="6400800" indent="0">
+            <a:lvl9pPr marL="10972800" indent="0">
               <a:buNone/>
-              <a:defRPr sz="2800">
+              <a:defRPr sz="4800">
                 <a:solidFill>
                   <a:schemeClr val="tx1">
                     <a:tint val="75000"/>
@@ -1430,7 +1428,7 @@
           <a:p>
             <a:fld id="{BD61937F-DF06-45E9-9EBC-D5170D9BB498}" type="datetimeFigureOut">
               <a:rPr lang="en-US" smtClean="0"/>
-              <a:t>3/12/2024</a:t>
+              <a:t>6/10/2024</a:t>
             </a:fld>
             <a:endParaRPr lang="en-US"/>
           </a:p>
@@ -1481,7 +1479,7 @@
     </p:spTree>
     <p:extLst>
       <p:ext uri="{BB962C8B-B14F-4D97-AF65-F5344CB8AC3E}">
-        <p14:creationId xmlns:p14="http://schemas.microsoft.com/office/powerpoint/2010/main" val="835159864"/>
+        <p14:creationId xmlns:p14="http://schemas.microsoft.com/office/powerpoint/2010/main" val="3154573391"/>
       </p:ext>
     </p:extLst>
   </p:cSld>
@@ -1543,8 +1541,8 @@
         </p:nvSpPr>
         <p:spPr>
           <a:xfrm>
-            <a:off x="1466850" y="3651250"/>
-            <a:ext cx="9067800" cy="8702676"/>
+            <a:off x="1885950" y="7302500"/>
+            <a:ext cx="11658600" cy="17405352"/>
           </a:xfrm>
         </p:spPr>
         <p:txBody>
@@ -1600,8 +1598,8 @@
         </p:nvSpPr>
         <p:spPr>
           <a:xfrm>
-            <a:off x="10801350" y="3651250"/>
-            <a:ext cx="9067800" cy="8702676"/>
+            <a:off x="13887450" y="7302500"/>
+            <a:ext cx="11658600" cy="17405352"/>
           </a:xfrm>
         </p:spPr>
         <p:txBody>
@@ -1662,7 +1660,7 @@
           <a:p>
             <a:fld id="{BD61937F-DF06-45E9-9EBC-D5170D9BB498}" type="datetimeFigureOut">
               <a:rPr lang="en-US" smtClean="0"/>
-              <a:t>3/12/2024</a:t>
+              <a:t>6/10/2024</a:t>
             </a:fld>
             <a:endParaRPr lang="en-US"/>
           </a:p>
@@ -1713,7 +1711,7 @@
     </p:spTree>
     <p:extLst>
       <p:ext uri="{BB962C8B-B14F-4D97-AF65-F5344CB8AC3E}">
-        <p14:creationId xmlns:p14="http://schemas.microsoft.com/office/powerpoint/2010/main" val="2927090914"/>
+        <p14:creationId xmlns:p14="http://schemas.microsoft.com/office/powerpoint/2010/main" val="2108763045"/>
       </p:ext>
     </p:extLst>
   </p:cSld>
@@ -1752,8 +1750,8 @@
         </p:nvSpPr>
         <p:spPr>
           <a:xfrm>
-            <a:off x="1469629" y="730251"/>
-            <a:ext cx="18402300" cy="2651126"/>
+            <a:off x="1889523" y="1460506"/>
+            <a:ext cx="23660100" cy="5302252"/>
           </a:xfrm>
         </p:spPr>
         <p:txBody>
@@ -1780,8 +1778,8 @@
         </p:nvSpPr>
         <p:spPr>
           <a:xfrm>
-            <a:off x="1469630" y="3362326"/>
-            <a:ext cx="9026127" cy="1647824"/>
+            <a:off x="1889526" y="6724652"/>
+            <a:ext cx="11605020" cy="3295648"/>
           </a:xfrm>
         </p:spPr>
         <p:txBody>
@@ -1789,39 +1787,39 @@
           <a:lstStyle>
             <a:lvl1pPr marL="0" indent="0">
               <a:buNone/>
-              <a:defRPr sz="4200" b="1"/>
+              <a:defRPr sz="7200" b="1"/>
             </a:lvl1pPr>
-            <a:lvl2pPr marL="800100" indent="0">
+            <a:lvl2pPr marL="1371600" indent="0">
               <a:buNone/>
-              <a:defRPr sz="3500" b="1"/>
+              <a:defRPr sz="6000" b="1"/>
             </a:lvl2pPr>
-            <a:lvl3pPr marL="1600200" indent="0">
+            <a:lvl3pPr marL="2743200" indent="0">
               <a:buNone/>
-              <a:defRPr sz="3150" b="1"/>
+              <a:defRPr sz="5400" b="1"/>
             </a:lvl3pPr>
-            <a:lvl4pPr marL="2400300" indent="0">
+            <a:lvl4pPr marL="4114800" indent="0">
               <a:buNone/>
-              <a:defRPr sz="2800" b="1"/>
+              <a:defRPr sz="4800" b="1"/>
             </a:lvl4pPr>
-            <a:lvl5pPr marL="3200400" indent="0">
+            <a:lvl5pPr marL="5486400" indent="0">
               <a:buNone/>
-              <a:defRPr sz="2800" b="1"/>
+              <a:defRPr sz="4800" b="1"/>
             </a:lvl5pPr>
-            <a:lvl6pPr marL="4000500" indent="0">
+            <a:lvl6pPr marL="6858000" indent="0">
               <a:buNone/>
-              <a:defRPr sz="2800" b="1"/>
+              <a:defRPr sz="4800" b="1"/>
             </a:lvl6pPr>
-            <a:lvl7pPr marL="4800600" indent="0">
+            <a:lvl7pPr marL="8229600" indent="0">
               <a:buNone/>
-              <a:defRPr sz="2800" b="1"/>
+              <a:defRPr sz="4800" b="1"/>
             </a:lvl7pPr>
-            <a:lvl8pPr marL="5600700" indent="0">
+            <a:lvl8pPr marL="9601200" indent="0">
               <a:buNone/>
-              <a:defRPr sz="2800" b="1"/>
+              <a:defRPr sz="4800" b="1"/>
             </a:lvl8pPr>
-            <a:lvl9pPr marL="6400800" indent="0">
+            <a:lvl9pPr marL="10972800" indent="0">
               <a:buNone/>
-              <a:defRPr sz="2800" b="1"/>
+              <a:defRPr sz="4800" b="1"/>
             </a:lvl9pPr>
           </a:lstStyle>
           <a:p>
@@ -1845,8 +1843,8 @@
         </p:nvSpPr>
         <p:spPr>
           <a:xfrm>
-            <a:off x="1469630" y="5010150"/>
-            <a:ext cx="9026127" cy="7369176"/>
+            <a:off x="1889526" y="10020300"/>
+            <a:ext cx="11605020" cy="14738352"/>
           </a:xfrm>
         </p:spPr>
         <p:txBody>
@@ -1902,8 +1900,8 @@
         </p:nvSpPr>
         <p:spPr>
           <a:xfrm>
-            <a:off x="10801350" y="3362326"/>
-            <a:ext cx="9070579" cy="1647824"/>
+            <a:off x="13887452" y="6724652"/>
+            <a:ext cx="11662173" cy="3295648"/>
           </a:xfrm>
         </p:spPr>
         <p:txBody>
@@ -1911,39 +1909,39 @@
           <a:lstStyle>
             <a:lvl1pPr marL="0" indent="0">
               <a:buNone/>
-              <a:defRPr sz="4200" b="1"/>
+              <a:defRPr sz="7200" b="1"/>
             </a:lvl1pPr>
-            <a:lvl2pPr marL="800100" indent="0">
+            <a:lvl2pPr marL="1371600" indent="0">
               <a:buNone/>
-              <a:defRPr sz="3500" b="1"/>
+              <a:defRPr sz="6000" b="1"/>
             </a:lvl2pPr>
-            <a:lvl3pPr marL="1600200" indent="0">
+            <a:lvl3pPr marL="2743200" indent="0">
               <a:buNone/>
-              <a:defRPr sz="3150" b="1"/>
+              <a:defRPr sz="5400" b="1"/>
             </a:lvl3pPr>
-            <a:lvl4pPr marL="2400300" indent="0">
+            <a:lvl4pPr marL="4114800" indent="0">
               <a:buNone/>
-              <a:defRPr sz="2800" b="1"/>
+              <a:defRPr sz="4800" b="1"/>
             </a:lvl4pPr>
-            <a:lvl5pPr marL="3200400" indent="0">
+            <a:lvl5pPr marL="5486400" indent="0">
               <a:buNone/>
-              <a:defRPr sz="2800" b="1"/>
+              <a:defRPr sz="4800" b="1"/>
             </a:lvl5pPr>
-            <a:lvl6pPr marL="4000500" indent="0">
+            <a:lvl6pPr marL="6858000" indent="0">
               <a:buNone/>
-              <a:defRPr sz="2800" b="1"/>
+              <a:defRPr sz="4800" b="1"/>
             </a:lvl6pPr>
-            <a:lvl7pPr marL="4800600" indent="0">
+            <a:lvl7pPr marL="8229600" indent="0">
               <a:buNone/>
-              <a:defRPr sz="2800" b="1"/>
+              <a:defRPr sz="4800" b="1"/>
             </a:lvl7pPr>
-            <a:lvl8pPr marL="5600700" indent="0">
+            <a:lvl8pPr marL="9601200" indent="0">
               <a:buNone/>
-              <a:defRPr sz="2800" b="1"/>
+              <a:defRPr sz="4800" b="1"/>
             </a:lvl8pPr>
-            <a:lvl9pPr marL="6400800" indent="0">
+            <a:lvl9pPr marL="10972800" indent="0">
               <a:buNone/>
-              <a:defRPr sz="2800" b="1"/>
+              <a:defRPr sz="4800" b="1"/>
             </a:lvl9pPr>
           </a:lstStyle>
           <a:p>
@@ -1967,8 +1965,8 @@
         </p:nvSpPr>
         <p:spPr>
           <a:xfrm>
-            <a:off x="10801350" y="5010150"/>
-            <a:ext cx="9070579" cy="7369176"/>
+            <a:off x="13887452" y="10020300"/>
+            <a:ext cx="11662173" cy="14738352"/>
           </a:xfrm>
         </p:spPr>
         <p:txBody>
@@ -2029,7 +2027,7 @@
           <a:p>
             <a:fld id="{BD61937F-DF06-45E9-9EBC-D5170D9BB498}" type="datetimeFigureOut">
               <a:rPr lang="en-US" smtClean="0"/>
-              <a:t>3/12/2024</a:t>
+              <a:t>6/10/2024</a:t>
             </a:fld>
             <a:endParaRPr lang="en-US"/>
           </a:p>
@@ -2080,7 +2078,7 @@
     </p:spTree>
     <p:extLst>
       <p:ext uri="{BB962C8B-B14F-4D97-AF65-F5344CB8AC3E}">
-        <p14:creationId xmlns:p14="http://schemas.microsoft.com/office/powerpoint/2010/main" val="3122912097"/>
+        <p14:creationId xmlns:p14="http://schemas.microsoft.com/office/powerpoint/2010/main" val="1912346338"/>
       </p:ext>
     </p:extLst>
   </p:cSld>
@@ -2147,7 +2145,7 @@
           <a:p>
             <a:fld id="{BD61937F-DF06-45E9-9EBC-D5170D9BB498}" type="datetimeFigureOut">
               <a:rPr lang="en-US" smtClean="0"/>
-              <a:t>3/12/2024</a:t>
+              <a:t>6/10/2024</a:t>
             </a:fld>
             <a:endParaRPr lang="en-US"/>
           </a:p>
@@ -2198,7 +2196,7 @@
     </p:spTree>
     <p:extLst>
       <p:ext uri="{BB962C8B-B14F-4D97-AF65-F5344CB8AC3E}">
-        <p14:creationId xmlns:p14="http://schemas.microsoft.com/office/powerpoint/2010/main" val="1983315055"/>
+        <p14:creationId xmlns:p14="http://schemas.microsoft.com/office/powerpoint/2010/main" val="2019598590"/>
       </p:ext>
     </p:extLst>
   </p:cSld>
@@ -2242,7 +2240,7 @@
           <a:p>
             <a:fld id="{BD61937F-DF06-45E9-9EBC-D5170D9BB498}" type="datetimeFigureOut">
               <a:rPr lang="en-US" smtClean="0"/>
-              <a:t>3/12/2024</a:t>
+              <a:t>6/10/2024</a:t>
             </a:fld>
             <a:endParaRPr lang="en-US"/>
           </a:p>
@@ -2293,7 +2291,7 @@
     </p:spTree>
     <p:extLst>
       <p:ext uri="{BB962C8B-B14F-4D97-AF65-F5344CB8AC3E}">
-        <p14:creationId xmlns:p14="http://schemas.microsoft.com/office/powerpoint/2010/main" val="2339867516"/>
+        <p14:creationId xmlns:p14="http://schemas.microsoft.com/office/powerpoint/2010/main" val="803583966"/>
       </p:ext>
     </p:extLst>
   </p:cSld>
@@ -2332,15 +2330,15 @@
         </p:nvSpPr>
         <p:spPr>
           <a:xfrm>
-            <a:off x="1469630" y="914400"/>
-            <a:ext cx="6881415" cy="3200400"/>
+            <a:off x="1889523" y="1828800"/>
+            <a:ext cx="8847534" cy="6400800"/>
           </a:xfrm>
         </p:spPr>
         <p:txBody>
           <a:bodyPr anchor="b"/>
           <a:lstStyle>
             <a:lvl1pPr>
-              <a:defRPr sz="5600"/>
+              <a:defRPr sz="9600"/>
             </a:lvl1pPr>
           </a:lstStyle>
           <a:p>
@@ -2364,39 +2362,39 @@
         </p:nvSpPr>
         <p:spPr>
           <a:xfrm>
-            <a:off x="9070579" y="1974851"/>
-            <a:ext cx="10801350" cy="9747250"/>
+            <a:off x="11662173" y="3949706"/>
+            <a:ext cx="13887450" cy="19494500"/>
           </a:xfrm>
         </p:spPr>
         <p:txBody>
           <a:bodyPr/>
           <a:lstStyle>
             <a:lvl1pPr>
-              <a:defRPr sz="5600"/>
+              <a:defRPr sz="9600"/>
             </a:lvl1pPr>
             <a:lvl2pPr>
-              <a:defRPr sz="4900"/>
+              <a:defRPr sz="8400"/>
             </a:lvl2pPr>
             <a:lvl3pPr>
-              <a:defRPr sz="4200"/>
+              <a:defRPr sz="7200"/>
             </a:lvl3pPr>
             <a:lvl4pPr>
-              <a:defRPr sz="3500"/>
+              <a:defRPr sz="6000"/>
             </a:lvl4pPr>
             <a:lvl5pPr>
-              <a:defRPr sz="3500"/>
+              <a:defRPr sz="6000"/>
             </a:lvl5pPr>
             <a:lvl6pPr>
-              <a:defRPr sz="3500"/>
+              <a:defRPr sz="6000"/>
             </a:lvl6pPr>
             <a:lvl7pPr>
-              <a:defRPr sz="3500"/>
+              <a:defRPr sz="6000"/>
             </a:lvl7pPr>
             <a:lvl8pPr>
-              <a:defRPr sz="3500"/>
+              <a:defRPr sz="6000"/>
             </a:lvl8pPr>
             <a:lvl9pPr>
-              <a:defRPr sz="3500"/>
+              <a:defRPr sz="6000"/>
             </a:lvl9pPr>
           </a:lstStyle>
           <a:p>
@@ -2449,8 +2447,8 @@
         </p:nvSpPr>
         <p:spPr>
           <a:xfrm>
-            <a:off x="1469630" y="4114800"/>
-            <a:ext cx="6881415" cy="7623176"/>
+            <a:off x="1889523" y="8229600"/>
+            <a:ext cx="8847534" cy="15246352"/>
           </a:xfrm>
         </p:spPr>
         <p:txBody>
@@ -2458,39 +2456,39 @@
           <a:lstStyle>
             <a:lvl1pPr marL="0" indent="0">
               <a:buNone/>
-              <a:defRPr sz="2800"/>
+              <a:defRPr sz="4800"/>
             </a:lvl1pPr>
-            <a:lvl2pPr marL="800100" indent="0">
+            <a:lvl2pPr marL="1371600" indent="0">
               <a:buNone/>
-              <a:defRPr sz="2450"/>
+              <a:defRPr sz="4200"/>
             </a:lvl2pPr>
-            <a:lvl3pPr marL="1600200" indent="0">
+            <a:lvl3pPr marL="2743200" indent="0">
               <a:buNone/>
-              <a:defRPr sz="2100"/>
+              <a:defRPr sz="3600"/>
             </a:lvl3pPr>
-            <a:lvl4pPr marL="2400300" indent="0">
+            <a:lvl4pPr marL="4114800" indent="0">
               <a:buNone/>
-              <a:defRPr sz="1750"/>
+              <a:defRPr sz="3000"/>
             </a:lvl4pPr>
-            <a:lvl5pPr marL="3200400" indent="0">
+            <a:lvl5pPr marL="5486400" indent="0">
               <a:buNone/>
-              <a:defRPr sz="1750"/>
+              <a:defRPr sz="3000"/>
             </a:lvl5pPr>
-            <a:lvl6pPr marL="4000500" indent="0">
+            <a:lvl6pPr marL="6858000" indent="0">
               <a:buNone/>
-              <a:defRPr sz="1750"/>
+              <a:defRPr sz="3000"/>
             </a:lvl6pPr>
-            <a:lvl7pPr marL="4800600" indent="0">
+            <a:lvl7pPr marL="8229600" indent="0">
               <a:buNone/>
-              <a:defRPr sz="1750"/>
+              <a:defRPr sz="3000"/>
             </a:lvl7pPr>
-            <a:lvl8pPr marL="5600700" indent="0">
+            <a:lvl8pPr marL="9601200" indent="0">
               <a:buNone/>
-              <a:defRPr sz="1750"/>
+              <a:defRPr sz="3000"/>
             </a:lvl8pPr>
-            <a:lvl9pPr marL="6400800" indent="0">
+            <a:lvl9pPr marL="10972800" indent="0">
               <a:buNone/>
-              <a:defRPr sz="1750"/>
+              <a:defRPr sz="3000"/>
             </a:lvl9pPr>
           </a:lstStyle>
           <a:p>
@@ -2519,7 +2517,7 @@
           <a:p>
             <a:fld id="{BD61937F-DF06-45E9-9EBC-D5170D9BB498}" type="datetimeFigureOut">
               <a:rPr lang="en-US" smtClean="0"/>
-              <a:t>3/12/2024</a:t>
+              <a:t>6/10/2024</a:t>
             </a:fld>
             <a:endParaRPr lang="en-US"/>
           </a:p>
@@ -2570,7 +2568,7 @@
     </p:spTree>
     <p:extLst>
       <p:ext uri="{BB962C8B-B14F-4D97-AF65-F5344CB8AC3E}">
-        <p14:creationId xmlns:p14="http://schemas.microsoft.com/office/powerpoint/2010/main" val="336398989"/>
+        <p14:creationId xmlns:p14="http://schemas.microsoft.com/office/powerpoint/2010/main" val="1431800395"/>
       </p:ext>
     </p:extLst>
   </p:cSld>
@@ -2609,15 +2607,15 @@
         </p:nvSpPr>
         <p:spPr>
           <a:xfrm>
-            <a:off x="1469630" y="914400"/>
-            <a:ext cx="6881415" cy="3200400"/>
+            <a:off x="1889523" y="1828800"/>
+            <a:ext cx="8847534" cy="6400800"/>
           </a:xfrm>
         </p:spPr>
         <p:txBody>
           <a:bodyPr anchor="b"/>
           <a:lstStyle>
             <a:lvl1pPr>
-              <a:defRPr sz="5600"/>
+              <a:defRPr sz="9600"/>
             </a:lvl1pPr>
           </a:lstStyle>
           <a:p>
@@ -2641,8 +2639,8 @@
         </p:nvSpPr>
         <p:spPr>
           <a:xfrm>
-            <a:off x="9070579" y="1974851"/>
-            <a:ext cx="10801350" cy="9747250"/>
+            <a:off x="11662173" y="3949706"/>
+            <a:ext cx="13887450" cy="19494500"/>
           </a:xfrm>
         </p:spPr>
         <p:txBody>
@@ -2650,39 +2648,39 @@
           <a:lstStyle>
             <a:lvl1pPr marL="0" indent="0">
               <a:buNone/>
-              <a:defRPr sz="5600"/>
+              <a:defRPr sz="9600"/>
             </a:lvl1pPr>
-            <a:lvl2pPr marL="800100" indent="0">
+            <a:lvl2pPr marL="1371600" indent="0">
               <a:buNone/>
-              <a:defRPr sz="4900"/>
+              <a:defRPr sz="8400"/>
             </a:lvl2pPr>
-            <a:lvl3pPr marL="1600200" indent="0">
+            <a:lvl3pPr marL="2743200" indent="0">
               <a:buNone/>
-              <a:defRPr sz="4200"/>
+              <a:defRPr sz="7200"/>
             </a:lvl3pPr>
-            <a:lvl4pPr marL="2400300" indent="0">
+            <a:lvl4pPr marL="4114800" indent="0">
               <a:buNone/>
-              <a:defRPr sz="3500"/>
+              <a:defRPr sz="6000"/>
             </a:lvl4pPr>
-            <a:lvl5pPr marL="3200400" indent="0">
+            <a:lvl5pPr marL="5486400" indent="0">
               <a:buNone/>
-              <a:defRPr sz="3500"/>
+              <a:defRPr sz="6000"/>
             </a:lvl5pPr>
-            <a:lvl6pPr marL="4000500" indent="0">
+            <a:lvl6pPr marL="6858000" indent="0">
               <a:buNone/>
-              <a:defRPr sz="3500"/>
+              <a:defRPr sz="6000"/>
             </a:lvl6pPr>
-            <a:lvl7pPr marL="4800600" indent="0">
+            <a:lvl7pPr marL="8229600" indent="0">
               <a:buNone/>
-              <a:defRPr sz="3500"/>
+              <a:defRPr sz="6000"/>
             </a:lvl7pPr>
-            <a:lvl8pPr marL="5600700" indent="0">
+            <a:lvl8pPr marL="9601200" indent="0">
               <a:buNone/>
-              <a:defRPr sz="3500"/>
+              <a:defRPr sz="6000"/>
             </a:lvl8pPr>
-            <a:lvl9pPr marL="6400800" indent="0">
+            <a:lvl9pPr marL="10972800" indent="0">
               <a:buNone/>
-              <a:defRPr sz="3500"/>
+              <a:defRPr sz="6000"/>
             </a:lvl9pPr>
           </a:lstStyle>
           <a:p>
@@ -2706,8 +2704,8 @@
         </p:nvSpPr>
         <p:spPr>
           <a:xfrm>
-            <a:off x="1469630" y="4114800"/>
-            <a:ext cx="6881415" cy="7623176"/>
+            <a:off x="1889523" y="8229600"/>
+            <a:ext cx="8847534" cy="15246352"/>
           </a:xfrm>
         </p:spPr>
         <p:txBody>
@@ -2715,39 +2713,39 @@
           <a:lstStyle>
             <a:lvl1pPr marL="0" indent="0">
               <a:buNone/>
-              <a:defRPr sz="2800"/>
+              <a:defRPr sz="4800"/>
             </a:lvl1pPr>
-            <a:lvl2pPr marL="800100" indent="0">
+            <a:lvl2pPr marL="1371600" indent="0">
               <a:buNone/>
-              <a:defRPr sz="2450"/>
+              <a:defRPr sz="4200"/>
             </a:lvl2pPr>
-            <a:lvl3pPr marL="1600200" indent="0">
+            <a:lvl3pPr marL="2743200" indent="0">
               <a:buNone/>
-              <a:defRPr sz="2100"/>
+              <a:defRPr sz="3600"/>
             </a:lvl3pPr>
-            <a:lvl4pPr marL="2400300" indent="0">
+            <a:lvl4pPr marL="4114800" indent="0">
               <a:buNone/>
-              <a:defRPr sz="1750"/>
+              <a:defRPr sz="3000"/>
             </a:lvl4pPr>
-            <a:lvl5pPr marL="3200400" indent="0">
+            <a:lvl5pPr marL="5486400" indent="0">
               <a:buNone/>
-              <a:defRPr sz="1750"/>
+              <a:defRPr sz="3000"/>
             </a:lvl5pPr>
-            <a:lvl6pPr marL="4000500" indent="0">
+            <a:lvl6pPr marL="6858000" indent="0">
               <a:buNone/>
-              <a:defRPr sz="1750"/>
+              <a:defRPr sz="3000"/>
             </a:lvl6pPr>
-            <a:lvl7pPr marL="4800600" indent="0">
+            <a:lvl7pPr marL="8229600" indent="0">
               <a:buNone/>
-              <a:defRPr sz="1750"/>
+              <a:defRPr sz="3000"/>
             </a:lvl7pPr>
-            <a:lvl8pPr marL="5600700" indent="0">
+            <a:lvl8pPr marL="9601200" indent="0">
               <a:buNone/>
-              <a:defRPr sz="1750"/>
+              <a:defRPr sz="3000"/>
             </a:lvl8pPr>
-            <a:lvl9pPr marL="6400800" indent="0">
+            <a:lvl9pPr marL="10972800" indent="0">
               <a:buNone/>
-              <a:defRPr sz="1750"/>
+              <a:defRPr sz="3000"/>
             </a:lvl9pPr>
           </a:lstStyle>
           <a:p>
@@ -2776,7 +2774,7 @@
           <a:p>
             <a:fld id="{BD61937F-DF06-45E9-9EBC-D5170D9BB498}" type="datetimeFigureOut">
               <a:rPr lang="en-US" smtClean="0"/>
-              <a:t>3/12/2024</a:t>
+              <a:t>6/10/2024</a:t>
             </a:fld>
             <a:endParaRPr lang="en-US"/>
           </a:p>
@@ -2827,7 +2825,7 @@
     </p:spTree>
     <p:extLst>
       <p:ext uri="{BB962C8B-B14F-4D97-AF65-F5344CB8AC3E}">
-        <p14:creationId xmlns:p14="http://schemas.microsoft.com/office/powerpoint/2010/main" val="864338315"/>
+        <p14:creationId xmlns:p14="http://schemas.microsoft.com/office/powerpoint/2010/main" val="4090271463"/>
       </p:ext>
     </p:extLst>
   </p:cSld>
@@ -2871,8 +2869,8 @@
         </p:nvSpPr>
         <p:spPr>
           <a:xfrm>
-            <a:off x="1466850" y="730251"/>
-            <a:ext cx="18402300" cy="2651126"/>
+            <a:off x="1885950" y="1460506"/>
+            <a:ext cx="23660100" cy="5302252"/>
           </a:xfrm>
           <a:prstGeom prst="rect">
             <a:avLst/>
@@ -2904,8 +2902,8 @@
         </p:nvSpPr>
         <p:spPr>
           <a:xfrm>
-            <a:off x="1466850" y="3651250"/>
-            <a:ext cx="18402300" cy="8702676"/>
+            <a:off x="1885950" y="7302500"/>
+            <a:ext cx="23660100" cy="17405352"/>
           </a:xfrm>
           <a:prstGeom prst="rect">
             <a:avLst/>
@@ -2966,8 +2964,8 @@
         </p:nvSpPr>
         <p:spPr>
           <a:xfrm>
-            <a:off x="1466850" y="12712701"/>
-            <a:ext cx="4800600" cy="730250"/>
+            <a:off x="1885950" y="25425406"/>
+            <a:ext cx="6172200" cy="1460500"/>
           </a:xfrm>
           <a:prstGeom prst="rect">
             <a:avLst/>
@@ -2977,7 +2975,7 @@
           <a:bodyPr vert="horz" lIns="91440" tIns="45720" rIns="91440" bIns="45720" rtlCol="0" anchor="ctr"/>
           <a:lstStyle>
             <a:lvl1pPr algn="l">
-              <a:defRPr sz="2100">
+              <a:defRPr sz="3600">
                 <a:solidFill>
                   <a:schemeClr val="tx1">
                     <a:tint val="75000"/>
@@ -2989,7 +2987,7 @@
           <a:p>
             <a:fld id="{BD61937F-DF06-45E9-9EBC-D5170D9BB498}" type="datetimeFigureOut">
               <a:rPr lang="en-US" smtClean="0"/>
-              <a:t>3/12/2024</a:t>
+              <a:t>6/10/2024</a:t>
             </a:fld>
             <a:endParaRPr lang="en-US"/>
           </a:p>
@@ -3007,8 +3005,8 @@
         </p:nvSpPr>
         <p:spPr>
           <a:xfrm>
-            <a:off x="7067550" y="12712701"/>
-            <a:ext cx="7200900" cy="730250"/>
+            <a:off x="9086850" y="25425406"/>
+            <a:ext cx="9258300" cy="1460500"/>
           </a:xfrm>
           <a:prstGeom prst="rect">
             <a:avLst/>
@@ -3018,7 +3016,7 @@
           <a:bodyPr vert="horz" lIns="91440" tIns="45720" rIns="91440" bIns="45720" rtlCol="0" anchor="ctr"/>
           <a:lstStyle>
             <a:lvl1pPr algn="ctr">
-              <a:defRPr sz="2100">
+              <a:defRPr sz="3600">
                 <a:solidFill>
                   <a:schemeClr val="tx1">
                     <a:tint val="75000"/>
@@ -3044,8 +3042,8 @@
         </p:nvSpPr>
         <p:spPr>
           <a:xfrm>
-            <a:off x="15068550" y="12712701"/>
-            <a:ext cx="4800600" cy="730250"/>
+            <a:off x="19373850" y="25425406"/>
+            <a:ext cx="6172200" cy="1460500"/>
           </a:xfrm>
           <a:prstGeom prst="rect">
             <a:avLst/>
@@ -3055,7 +3053,7 @@
           <a:bodyPr vert="horz" lIns="91440" tIns="45720" rIns="91440" bIns="45720" rtlCol="0" anchor="ctr"/>
           <a:lstStyle>
             <a:lvl1pPr algn="r">
-              <a:defRPr sz="2100">
+              <a:defRPr sz="3600">
                 <a:solidFill>
                   <a:schemeClr val="tx1">
                     <a:tint val="75000"/>
@@ -3076,27 +3074,27 @@
     </p:spTree>
     <p:extLst>
       <p:ext uri="{BB962C8B-B14F-4D97-AF65-F5344CB8AC3E}">
-        <p14:creationId xmlns:p14="http://schemas.microsoft.com/office/powerpoint/2010/main" val="3531017668"/>
+        <p14:creationId xmlns:p14="http://schemas.microsoft.com/office/powerpoint/2010/main" val="2101158038"/>
       </p:ext>
     </p:extLst>
   </p:cSld>
   <p:clrMap bg1="lt1" tx1="dk1" bg2="lt2" tx2="dk2" accent1="accent1" accent2="accent2" accent3="accent3" accent4="accent4" accent5="accent5" accent6="accent6" hlink="hlink" folHlink="folHlink"/>
   <p:sldLayoutIdLst>
-    <p:sldLayoutId id="2147483661" r:id="rId1"/>
-    <p:sldLayoutId id="2147483662" r:id="rId2"/>
-    <p:sldLayoutId id="2147483663" r:id="rId3"/>
-    <p:sldLayoutId id="2147483664" r:id="rId4"/>
-    <p:sldLayoutId id="2147483665" r:id="rId5"/>
-    <p:sldLayoutId id="2147483666" r:id="rId6"/>
-    <p:sldLayoutId id="2147483667" r:id="rId7"/>
-    <p:sldLayoutId id="2147483668" r:id="rId8"/>
-    <p:sldLayoutId id="2147483669" r:id="rId9"/>
-    <p:sldLayoutId id="2147483670" r:id="rId10"/>
-    <p:sldLayoutId id="2147483671" r:id="rId11"/>
+    <p:sldLayoutId id="2147483673" r:id="rId1"/>
+    <p:sldLayoutId id="2147483674" r:id="rId2"/>
+    <p:sldLayoutId id="2147483675" r:id="rId3"/>
+    <p:sldLayoutId id="2147483676" r:id="rId4"/>
+    <p:sldLayoutId id="2147483677" r:id="rId5"/>
+    <p:sldLayoutId id="2147483678" r:id="rId6"/>
+    <p:sldLayoutId id="2147483679" r:id="rId7"/>
+    <p:sldLayoutId id="2147483680" r:id="rId8"/>
+    <p:sldLayoutId id="2147483681" r:id="rId9"/>
+    <p:sldLayoutId id="2147483682" r:id="rId10"/>
+    <p:sldLayoutId id="2147483683" r:id="rId11"/>
   </p:sldLayoutIdLst>
   <p:txStyles>
     <p:titleStyle>
-      <a:lvl1pPr algn="l" defTabSz="1600200" rtl="0" eaLnBrk="1" latinLnBrk="0" hangingPunct="1">
+      <a:lvl1pPr algn="l" defTabSz="2743200" rtl="0" eaLnBrk="1" latinLnBrk="0" hangingPunct="1">
         <a:lnSpc>
           <a:spcPct val="90000"/>
         </a:lnSpc>
@@ -3104,7 +3102,7 @@
           <a:spcPct val="0"/>
         </a:spcBef>
         <a:buNone/>
-        <a:defRPr sz="7700" kern="1200">
+        <a:defRPr sz="13200" kern="1200">
           <a:solidFill>
             <a:schemeClr val="tx1"/>
           </a:solidFill>
@@ -3115,16 +3113,16 @@
       </a:lvl1pPr>
     </p:titleStyle>
     <p:bodyStyle>
-      <a:lvl1pPr marL="400050" indent="-400050" algn="l" defTabSz="1600200" rtl="0" eaLnBrk="1" latinLnBrk="0" hangingPunct="1">
+      <a:lvl1pPr marL="685800" indent="-685800" algn="l" defTabSz="2743200" rtl="0" eaLnBrk="1" latinLnBrk="0" hangingPunct="1">
         <a:lnSpc>
           <a:spcPct val="90000"/>
         </a:lnSpc>
         <a:spcBef>
-          <a:spcPts val="1750"/>
+          <a:spcPts val="3000"/>
         </a:spcBef>
         <a:buFont typeface="Arial" panose="020B0604020202020204" pitchFamily="34" charset="0"/>
         <a:buChar char="•"/>
-        <a:defRPr sz="4900" kern="1200">
+        <a:defRPr sz="8400" kern="1200">
           <a:solidFill>
             <a:schemeClr val="tx1"/>
           </a:solidFill>
@@ -3133,16 +3131,16 @@
           <a:cs typeface="+mn-cs"/>
         </a:defRPr>
       </a:lvl1pPr>
-      <a:lvl2pPr marL="1200150" indent="-400050" algn="l" defTabSz="1600200" rtl="0" eaLnBrk="1" latinLnBrk="0" hangingPunct="1">
+      <a:lvl2pPr marL="2057400" indent="-685800" algn="l" defTabSz="2743200" rtl="0" eaLnBrk="1" latinLnBrk="0" hangingPunct="1">
         <a:lnSpc>
           <a:spcPct val="90000"/>
         </a:lnSpc>
         <a:spcBef>
-          <a:spcPts val="875"/>
+          <a:spcPts val="1500"/>
         </a:spcBef>
         <a:buFont typeface="Arial" panose="020B0604020202020204" pitchFamily="34" charset="0"/>
         <a:buChar char="•"/>
-        <a:defRPr sz="4200" kern="1200">
+        <a:defRPr sz="7200" kern="1200">
           <a:solidFill>
             <a:schemeClr val="tx1"/>
           </a:solidFill>
@@ -3151,16 +3149,16 @@
           <a:cs typeface="+mn-cs"/>
         </a:defRPr>
       </a:lvl2pPr>
-      <a:lvl3pPr marL="2000250" indent="-400050" algn="l" defTabSz="1600200" rtl="0" eaLnBrk="1" latinLnBrk="0" hangingPunct="1">
+      <a:lvl3pPr marL="3429000" indent="-685800" algn="l" defTabSz="2743200" rtl="0" eaLnBrk="1" latinLnBrk="0" hangingPunct="1">
         <a:lnSpc>
           <a:spcPct val="90000"/>
         </a:lnSpc>
         <a:spcBef>
-          <a:spcPts val="875"/>
+          <a:spcPts val="1500"/>
         </a:spcBef>
         <a:buFont typeface="Arial" panose="020B0604020202020204" pitchFamily="34" charset="0"/>
         <a:buChar char="•"/>
-        <a:defRPr sz="3500" kern="1200">
+        <a:defRPr sz="6000" kern="1200">
           <a:solidFill>
             <a:schemeClr val="tx1"/>
           </a:solidFill>
@@ -3169,16 +3167,16 @@
           <a:cs typeface="+mn-cs"/>
         </a:defRPr>
       </a:lvl3pPr>
-      <a:lvl4pPr marL="2800350" indent="-400050" algn="l" defTabSz="1600200" rtl="0" eaLnBrk="1" latinLnBrk="0" hangingPunct="1">
+      <a:lvl4pPr marL="4800600" indent="-685800" algn="l" defTabSz="2743200" rtl="0" eaLnBrk="1" latinLnBrk="0" hangingPunct="1">
         <a:lnSpc>
           <a:spcPct val="90000"/>
         </a:lnSpc>
         <a:spcBef>
-          <a:spcPts val="875"/>
+          <a:spcPts val="1500"/>
         </a:spcBef>
         <a:buFont typeface="Arial" panose="020B0604020202020204" pitchFamily="34" charset="0"/>
         <a:buChar char="•"/>
-        <a:defRPr sz="3150" kern="1200">
+        <a:defRPr sz="5400" kern="1200">
           <a:solidFill>
             <a:schemeClr val="tx1"/>
           </a:solidFill>
@@ -3187,16 +3185,16 @@
           <a:cs typeface="+mn-cs"/>
         </a:defRPr>
       </a:lvl4pPr>
-      <a:lvl5pPr marL="3600450" indent="-400050" algn="l" defTabSz="1600200" rtl="0" eaLnBrk="1" latinLnBrk="0" hangingPunct="1">
+      <a:lvl5pPr marL="6172200" indent="-685800" algn="l" defTabSz="2743200" rtl="0" eaLnBrk="1" latinLnBrk="0" hangingPunct="1">
         <a:lnSpc>
           <a:spcPct val="90000"/>
         </a:lnSpc>
         <a:spcBef>
-          <a:spcPts val="875"/>
+          <a:spcPts val="1500"/>
         </a:spcBef>
         <a:buFont typeface="Arial" panose="020B0604020202020204" pitchFamily="34" charset="0"/>
         <a:buChar char="•"/>
-        <a:defRPr sz="3150" kern="1200">
+        <a:defRPr sz="5400" kern="1200">
           <a:solidFill>
             <a:schemeClr val="tx1"/>
           </a:solidFill>
@@ -3205,16 +3203,16 @@
           <a:cs typeface="+mn-cs"/>
         </a:defRPr>
       </a:lvl5pPr>
-      <a:lvl6pPr marL="4400550" indent="-400050" algn="l" defTabSz="1600200" rtl="0" eaLnBrk="1" latinLnBrk="0" hangingPunct="1">
+      <a:lvl6pPr marL="7543800" indent="-685800" algn="l" defTabSz="2743200" rtl="0" eaLnBrk="1" latinLnBrk="0" hangingPunct="1">
         <a:lnSpc>
           <a:spcPct val="90000"/>
         </a:lnSpc>
         <a:spcBef>
-          <a:spcPts val="875"/>
+          <a:spcPts val="1500"/>
         </a:spcBef>
         <a:buFont typeface="Arial" panose="020B0604020202020204" pitchFamily="34" charset="0"/>
         <a:buChar char="•"/>
-        <a:defRPr sz="3150" kern="1200">
+        <a:defRPr sz="5400" kern="1200">
           <a:solidFill>
             <a:schemeClr val="tx1"/>
           </a:solidFill>
@@ -3223,16 +3221,16 @@
           <a:cs typeface="+mn-cs"/>
         </a:defRPr>
       </a:lvl6pPr>
-      <a:lvl7pPr marL="5200650" indent="-400050" algn="l" defTabSz="1600200" rtl="0" eaLnBrk="1" latinLnBrk="0" hangingPunct="1">
+      <a:lvl7pPr marL="8915400" indent="-685800" algn="l" defTabSz="2743200" rtl="0" eaLnBrk="1" latinLnBrk="0" hangingPunct="1">
         <a:lnSpc>
           <a:spcPct val="90000"/>
         </a:lnSpc>
         <a:spcBef>
-          <a:spcPts val="875"/>
+          <a:spcPts val="1500"/>
         </a:spcBef>
         <a:buFont typeface="Arial" panose="020B0604020202020204" pitchFamily="34" charset="0"/>
         <a:buChar char="•"/>
-        <a:defRPr sz="3150" kern="1200">
+        <a:defRPr sz="5400" kern="1200">
           <a:solidFill>
             <a:schemeClr val="tx1"/>
           </a:solidFill>
@@ -3241,16 +3239,16 @@
           <a:cs typeface="+mn-cs"/>
         </a:defRPr>
       </a:lvl7pPr>
-      <a:lvl8pPr marL="6000750" indent="-400050" algn="l" defTabSz="1600200" rtl="0" eaLnBrk="1" latinLnBrk="0" hangingPunct="1">
+      <a:lvl8pPr marL="10287000" indent="-685800" algn="l" defTabSz="2743200" rtl="0" eaLnBrk="1" latinLnBrk="0" hangingPunct="1">
         <a:lnSpc>
           <a:spcPct val="90000"/>
         </a:lnSpc>
         <a:spcBef>
-          <a:spcPts val="875"/>
+          <a:spcPts val="1500"/>
         </a:spcBef>
         <a:buFont typeface="Arial" panose="020B0604020202020204" pitchFamily="34" charset="0"/>
         <a:buChar char="•"/>
-        <a:defRPr sz="3150" kern="1200">
+        <a:defRPr sz="5400" kern="1200">
           <a:solidFill>
             <a:schemeClr val="tx1"/>
           </a:solidFill>
@@ -3259,16 +3257,16 @@
           <a:cs typeface="+mn-cs"/>
         </a:defRPr>
       </a:lvl8pPr>
-      <a:lvl9pPr marL="6800850" indent="-400050" algn="l" defTabSz="1600200" rtl="0" eaLnBrk="1" latinLnBrk="0" hangingPunct="1">
+      <a:lvl9pPr marL="11658600" indent="-685800" algn="l" defTabSz="2743200" rtl="0" eaLnBrk="1" latinLnBrk="0" hangingPunct="1">
         <a:lnSpc>
           <a:spcPct val="90000"/>
         </a:lnSpc>
         <a:spcBef>
-          <a:spcPts val="875"/>
+          <a:spcPts val="1500"/>
         </a:spcBef>
         <a:buFont typeface="Arial" panose="020B0604020202020204" pitchFamily="34" charset="0"/>
         <a:buChar char="•"/>
-        <a:defRPr sz="3150" kern="1200">
+        <a:defRPr sz="5400" kern="1200">
           <a:solidFill>
             <a:schemeClr val="tx1"/>
           </a:solidFill>
@@ -3282,8 +3280,8 @@
       <a:defPPr>
         <a:defRPr lang="en-US"/>
       </a:defPPr>
-      <a:lvl1pPr marL="0" algn="l" defTabSz="1600200" rtl="0" eaLnBrk="1" latinLnBrk="0" hangingPunct="1">
-        <a:defRPr sz="3150" kern="1200">
+      <a:lvl1pPr marL="0" algn="l" defTabSz="2743200" rtl="0" eaLnBrk="1" latinLnBrk="0" hangingPunct="1">
+        <a:defRPr sz="5400" kern="1200">
           <a:solidFill>
             <a:schemeClr val="tx1"/>
           </a:solidFill>
@@ -3292,8 +3290,8 @@
           <a:cs typeface="+mn-cs"/>
         </a:defRPr>
       </a:lvl1pPr>
-      <a:lvl2pPr marL="800100" algn="l" defTabSz="1600200" rtl="0" eaLnBrk="1" latinLnBrk="0" hangingPunct="1">
-        <a:defRPr sz="3150" kern="1200">
+      <a:lvl2pPr marL="1371600" algn="l" defTabSz="2743200" rtl="0" eaLnBrk="1" latinLnBrk="0" hangingPunct="1">
+        <a:defRPr sz="5400" kern="1200">
           <a:solidFill>
             <a:schemeClr val="tx1"/>
           </a:solidFill>
@@ -3302,8 +3300,8 @@
           <a:cs typeface="+mn-cs"/>
         </a:defRPr>
       </a:lvl2pPr>
-      <a:lvl3pPr marL="1600200" algn="l" defTabSz="1600200" rtl="0" eaLnBrk="1" latinLnBrk="0" hangingPunct="1">
-        <a:defRPr sz="3150" kern="1200">
+      <a:lvl3pPr marL="2743200" algn="l" defTabSz="2743200" rtl="0" eaLnBrk="1" latinLnBrk="0" hangingPunct="1">
+        <a:defRPr sz="5400" kern="1200">
           <a:solidFill>
             <a:schemeClr val="tx1"/>
           </a:solidFill>
@@ -3312,8 +3310,8 @@
           <a:cs typeface="+mn-cs"/>
         </a:defRPr>
       </a:lvl3pPr>
-      <a:lvl4pPr marL="2400300" algn="l" defTabSz="1600200" rtl="0" eaLnBrk="1" latinLnBrk="0" hangingPunct="1">
-        <a:defRPr sz="3150" kern="1200">
+      <a:lvl4pPr marL="4114800" algn="l" defTabSz="2743200" rtl="0" eaLnBrk="1" latinLnBrk="0" hangingPunct="1">
+        <a:defRPr sz="5400" kern="1200">
           <a:solidFill>
             <a:schemeClr val="tx1"/>
           </a:solidFill>
@@ -3322,8 +3320,8 @@
           <a:cs typeface="+mn-cs"/>
         </a:defRPr>
       </a:lvl4pPr>
-      <a:lvl5pPr marL="3200400" algn="l" defTabSz="1600200" rtl="0" eaLnBrk="1" latinLnBrk="0" hangingPunct="1">
-        <a:defRPr sz="3150" kern="1200">
+      <a:lvl5pPr marL="5486400" algn="l" defTabSz="2743200" rtl="0" eaLnBrk="1" latinLnBrk="0" hangingPunct="1">
+        <a:defRPr sz="5400" kern="1200">
           <a:solidFill>
             <a:schemeClr val="tx1"/>
           </a:solidFill>
@@ -3332,8 +3330,8 @@
           <a:cs typeface="+mn-cs"/>
         </a:defRPr>
       </a:lvl5pPr>
-      <a:lvl6pPr marL="4000500" algn="l" defTabSz="1600200" rtl="0" eaLnBrk="1" latinLnBrk="0" hangingPunct="1">
-        <a:defRPr sz="3150" kern="1200">
+      <a:lvl6pPr marL="6858000" algn="l" defTabSz="2743200" rtl="0" eaLnBrk="1" latinLnBrk="0" hangingPunct="1">
+        <a:defRPr sz="5400" kern="1200">
           <a:solidFill>
             <a:schemeClr val="tx1"/>
           </a:solidFill>
@@ -3342,8 +3340,8 @@
           <a:cs typeface="+mn-cs"/>
         </a:defRPr>
       </a:lvl6pPr>
-      <a:lvl7pPr marL="4800600" algn="l" defTabSz="1600200" rtl="0" eaLnBrk="1" latinLnBrk="0" hangingPunct="1">
-        <a:defRPr sz="3150" kern="1200">
+      <a:lvl7pPr marL="8229600" algn="l" defTabSz="2743200" rtl="0" eaLnBrk="1" latinLnBrk="0" hangingPunct="1">
+        <a:defRPr sz="5400" kern="1200">
           <a:solidFill>
             <a:schemeClr val="tx1"/>
           </a:solidFill>
@@ -3352,8 +3350,8 @@
           <a:cs typeface="+mn-cs"/>
         </a:defRPr>
       </a:lvl7pPr>
-      <a:lvl8pPr marL="5600700" algn="l" defTabSz="1600200" rtl="0" eaLnBrk="1" latinLnBrk="0" hangingPunct="1">
-        <a:defRPr sz="3150" kern="1200">
+      <a:lvl8pPr marL="9601200" algn="l" defTabSz="2743200" rtl="0" eaLnBrk="1" latinLnBrk="0" hangingPunct="1">
+        <a:defRPr sz="5400" kern="1200">
           <a:solidFill>
             <a:schemeClr val="tx1"/>
           </a:solidFill>
@@ -3362,8 +3360,8 @@
           <a:cs typeface="+mn-cs"/>
         </a:defRPr>
       </a:lvl8pPr>
-      <a:lvl9pPr marL="6400800" algn="l" defTabSz="1600200" rtl="0" eaLnBrk="1" latinLnBrk="0" hangingPunct="1">
-        <a:defRPr sz="3150" kern="1200">
+      <a:lvl9pPr marL="10972800" algn="l" defTabSz="2743200" rtl="0" eaLnBrk="1" latinLnBrk="0" hangingPunct="1">
+        <a:defRPr sz="5400" kern="1200">
           <a:solidFill>
             <a:schemeClr val="tx1"/>
           </a:solidFill>
@@ -3396,6 +3394,58 @@
       </p:grpSpPr>
       <p:sp>
         <p:nvSpPr>
+          <p:cNvPr id="38" name="Rectangle 37">
+            <a:extLst>
+              <a:ext uri="{FF2B5EF4-FFF2-40B4-BE49-F238E27FC236}">
+                <a16:creationId xmlns:a16="http://schemas.microsoft.com/office/drawing/2014/main" id="{B5312869-43F7-167C-9D6C-9E19B89F512C}"/>
+              </a:ext>
+            </a:extLst>
+          </p:cNvPr>
+          <p:cNvSpPr/>
+          <p:nvPr/>
+        </p:nvSpPr>
+        <p:spPr>
+          <a:xfrm>
+            <a:off x="2438400" y="4084320"/>
+            <a:ext cx="22494240" cy="16946880"/>
+          </a:xfrm>
+          <a:prstGeom prst="rect">
+            <a:avLst/>
+          </a:prstGeom>
+          <a:solidFill>
+            <a:schemeClr val="bg1"/>
+          </a:solidFill>
+          <a:ln>
+            <a:noFill/>
+          </a:ln>
+        </p:spPr>
+        <p:style>
+          <a:lnRef idx="2">
+            <a:schemeClr val="accent1">
+              <a:shade val="15000"/>
+            </a:schemeClr>
+          </a:lnRef>
+          <a:fillRef idx="1">
+            <a:schemeClr val="accent1"/>
+          </a:fillRef>
+          <a:effectRef idx="0">
+            <a:schemeClr val="accent1"/>
+          </a:effectRef>
+          <a:fontRef idx="minor">
+            <a:schemeClr val="lt1"/>
+          </a:fontRef>
+        </p:style>
+        <p:txBody>
+          <a:bodyPr rtlCol="0" anchor="ctr"/>
+          <a:lstStyle/>
+          <a:p>
+            <a:pPr algn="ctr"/>
+            <a:endParaRPr lang="en-US"/>
+          </a:p>
+        </p:txBody>
+      </p:sp>
+      <p:sp>
+        <p:nvSpPr>
           <p:cNvPr id="53" name="Rectangle 52">
             <a:extLst>
               <a:ext uri="{FF2B5EF4-FFF2-40B4-BE49-F238E27FC236}">
@@ -3408,7 +3458,7 @@
         </p:nvSpPr>
         <p:spPr>
           <a:xfrm rot="10800000">
-            <a:off x="-18266" y="-2"/>
+            <a:off x="3029734" y="6857999"/>
             <a:ext cx="21354266" cy="13716001"/>
           </a:xfrm>
           <a:prstGeom prst="rect">
@@ -3461,7 +3511,7 @@
         </p:nvSpPr>
         <p:spPr>
           <a:xfrm rot="10800000">
-            <a:off x="243840" y="1843805"/>
+            <a:off x="3291840" y="8701806"/>
             <a:ext cx="20863560" cy="9222909"/>
           </a:xfrm>
           <a:prstGeom prst="rect">
@@ -3516,7 +3566,7 @@
         </p:nvSpPr>
         <p:spPr>
           <a:xfrm>
-            <a:off x="15071471" y="1953494"/>
+            <a:off x="18119472" y="8811496"/>
             <a:ext cx="5927169" cy="8890231"/>
           </a:xfrm>
           <a:prstGeom prst="rect">
@@ -3551,7 +3601,14 @@
           <a:p>
             <a:pPr algn="ctr"/>
             <a:r>
-              <a:rPr lang="en-US" sz="3200" b="1" dirty="0"/>
+              <a:rPr lang="en-US" sz="3200" b="1" dirty="0">
+                <a:solidFill>
+                  <a:schemeClr val="tx1">
+                    <a:lumMod val="75000"/>
+                    <a:lumOff val="25000"/>
+                  </a:schemeClr>
+                </a:solidFill>
+              </a:rPr>
               <a:t>MACHINE LEARNING</a:t>
             </a:r>
           </a:p>
@@ -3571,16 +3628,16 @@
         </p:nvSpPr>
         <p:spPr>
           <a:xfrm>
-            <a:off x="384024" y="1960455"/>
+            <a:off x="3432024" y="8818456"/>
             <a:ext cx="14141738" cy="8890231"/>
           </a:xfrm>
           <a:prstGeom prst="rect">
             <a:avLst/>
           </a:prstGeom>
           <a:solidFill>
-            <a:schemeClr val="accent5">
-              <a:alpha val="50000"/>
-            </a:schemeClr>
+            <a:srgbClr val="5B9BD5">
+              <a:alpha val="20000"/>
+            </a:srgbClr>
           </a:solidFill>
           <a:ln>
             <a:noFill/>
@@ -3606,7 +3663,14 @@
           <a:p>
             <a:pPr algn="ctr"/>
             <a:r>
-              <a:rPr lang="en-US" sz="3200" b="1" dirty="0"/>
+              <a:rPr lang="en-US" sz="3200" b="1" dirty="0">
+                <a:solidFill>
+                  <a:schemeClr val="tx1">
+                    <a:lumMod val="75000"/>
+                    <a:lumOff val="25000"/>
+                  </a:schemeClr>
+                </a:solidFill>
+              </a:rPr>
               <a:t>DATA PREPARATION</a:t>
             </a:r>
           </a:p>
@@ -3626,7 +3690,7 @@
         </p:nvGrpSpPr>
         <p:grpSpPr>
           <a:xfrm>
-            <a:off x="683367" y="2728564"/>
+            <a:off x="3731368" y="9586564"/>
             <a:ext cx="13265389" cy="7689292"/>
             <a:chOff x="345495" y="1469456"/>
             <a:chExt cx="18533487" cy="8113456"/>
@@ -4528,6 +4592,11 @@
             <a:prstGeom prst="rect">
               <a:avLst/>
             </a:prstGeom>
+            <a:solidFill>
+              <a:schemeClr val="accent2">
+                <a:lumMod val="75000"/>
+              </a:schemeClr>
+            </a:solidFill>
             <a:ln>
               <a:noFill/>
             </a:ln>
@@ -4582,6 +4651,11 @@
             <a:prstGeom prst="rect">
               <a:avLst/>
             </a:prstGeom>
+            <a:solidFill>
+              <a:schemeClr val="accent2">
+                <a:lumMod val="75000"/>
+              </a:schemeClr>
+            </a:solidFill>
             <a:ln>
               <a:noFill/>
             </a:ln>
@@ -4636,6 +4710,11 @@
             <a:prstGeom prst="rect">
               <a:avLst/>
             </a:prstGeom>
+            <a:solidFill>
+              <a:schemeClr val="accent2">
+                <a:lumMod val="75000"/>
+              </a:schemeClr>
+            </a:solidFill>
             <a:ln>
               <a:noFill/>
             </a:ln>
@@ -5502,7 +5581,7 @@
         </p:nvGrpSpPr>
         <p:grpSpPr>
           <a:xfrm>
-            <a:off x="15411157" y="2748233"/>
+            <a:off x="18459159" y="9606234"/>
             <a:ext cx="4988275" cy="7654383"/>
             <a:chOff x="16652572" y="2164978"/>
             <a:chExt cx="2825602" cy="4669339"/>
@@ -6032,7 +6111,7 @@
         </p:nvCxnSpPr>
         <p:spPr>
           <a:xfrm flipV="1">
-            <a:off x="13835312" y="3262820"/>
+            <a:off x="16883314" y="10120821"/>
             <a:ext cx="1575845" cy="3059631"/>
           </a:xfrm>
           <a:prstGeom prst="curvedConnector3">
@@ -6073,7 +6152,7 @@
         </p:nvSpPr>
         <p:spPr>
           <a:xfrm>
-            <a:off x="7282500" y="222429"/>
+            <a:off x="10185928" y="5178202"/>
             <a:ext cx="2308281" cy="1411703"/>
           </a:xfrm>
           <a:prstGeom prst="rect">
@@ -6129,12 +6208,17 @@
         </p:nvSpPr>
         <p:spPr>
           <a:xfrm>
-            <a:off x="384024" y="211769"/>
+            <a:off x="3287451" y="5167541"/>
             <a:ext cx="2308281" cy="1485285"/>
           </a:xfrm>
           <a:prstGeom prst="rect">
             <a:avLst/>
           </a:prstGeom>
+          <a:solidFill>
+            <a:schemeClr val="accent2">
+              <a:lumMod val="75000"/>
+            </a:schemeClr>
+          </a:solidFill>
           <a:ln>
             <a:noFill/>
           </a:ln>
@@ -6179,7 +6263,7 @@
         </p:nvSpPr>
         <p:spPr>
           <a:xfrm>
-            <a:off x="10731738" y="211769"/>
+            <a:off x="13635166" y="5167540"/>
             <a:ext cx="2478663" cy="1450734"/>
           </a:xfrm>
           <a:prstGeom prst="rect">
@@ -6241,7 +6325,7 @@
         </p:nvSpPr>
         <p:spPr>
           <a:xfrm>
-            <a:off x="14351358" y="194058"/>
+            <a:off x="17254786" y="5149829"/>
             <a:ext cx="2585167" cy="1442160"/>
           </a:xfrm>
           <a:prstGeom prst="rect">
@@ -6303,7 +6387,7 @@
         </p:nvSpPr>
         <p:spPr>
           <a:xfrm>
-            <a:off x="2122572" y="11849017"/>
+            <a:off x="5170573" y="18707018"/>
             <a:ext cx="3436495" cy="1449393"/>
           </a:xfrm>
           <a:prstGeom prst="rect">
@@ -6357,7 +6441,7 @@
         </p:nvSpPr>
         <p:spPr>
           <a:xfrm rot="16200000">
-            <a:off x="10252502" y="951376"/>
+            <a:off x="13300503" y="7809377"/>
             <a:ext cx="830997" cy="20848318"/>
           </a:xfrm>
           <a:prstGeom prst="leftBrace">
@@ -6405,7 +6489,7 @@
         </p:nvSpPr>
         <p:spPr>
           <a:xfrm>
-            <a:off x="18077484" y="241355"/>
+            <a:off x="20980912" y="5197128"/>
             <a:ext cx="2866911" cy="1411703"/>
           </a:xfrm>
           <a:prstGeom prst="rect">
@@ -6483,7 +6567,7 @@
         </p:blipFill>
         <p:spPr>
           <a:xfrm>
-            <a:off x="9943302" y="11861962"/>
+            <a:off x="12991304" y="18719964"/>
             <a:ext cx="1449393" cy="1449393"/>
           </a:xfrm>
           <a:prstGeom prst="rect">
@@ -6507,7 +6591,7 @@
         </p:nvCxnSpPr>
         <p:spPr>
           <a:xfrm>
-            <a:off x="5952848" y="12619403"/>
+            <a:off x="9000848" y="19477403"/>
             <a:ext cx="3382656" cy="0"/>
           </a:xfrm>
           <a:prstGeom prst="straightConnector1">
@@ -6546,7 +6630,7 @@
         </p:nvSpPr>
         <p:spPr>
           <a:xfrm>
-            <a:off x="11600533" y="12201275"/>
+            <a:off x="14648533" y="19059277"/>
             <a:ext cx="5428820" cy="830997"/>
           </a:xfrm>
           <a:prstGeom prst="rect">
@@ -6582,7 +6666,7 @@
         </p:nvSpPr>
         <p:spPr>
           <a:xfrm>
-            <a:off x="3833262" y="196144"/>
+            <a:off x="6736690" y="5151917"/>
             <a:ext cx="2308281" cy="1485285"/>
           </a:xfrm>
           <a:prstGeom prst="rect">
@@ -6618,6 +6702,112 @@
           </a:p>
         </p:txBody>
       </p:sp>
+      <p:sp>
+        <p:nvSpPr>
+          <p:cNvPr id="50" name="TextBox 49">
+            <a:extLst>
+              <a:ext uri="{FF2B5EF4-FFF2-40B4-BE49-F238E27FC236}">
+                <a16:creationId xmlns:a16="http://schemas.microsoft.com/office/drawing/2014/main" id="{133DB72E-5634-1E0E-A0F0-C65C33318B69}"/>
+              </a:ext>
+            </a:extLst>
+          </p:cNvPr>
+          <p:cNvSpPr txBox="1"/>
+          <p:nvPr/>
+        </p:nvSpPr>
+        <p:spPr>
+          <a:xfrm flipH="1">
+            <a:off x="3226193" y="4494887"/>
+            <a:ext cx="6898478" cy="523220"/>
+          </a:xfrm>
+          <a:prstGeom prst="rect">
+            <a:avLst/>
+          </a:prstGeom>
+          <a:noFill/>
+        </p:spPr>
+        <p:txBody>
+          <a:bodyPr wrap="square" rtlCol="0">
+            <a:spAutoFit/>
+          </a:bodyPr>
+          <a:lstStyle/>
+          <a:p>
+            <a:r>
+              <a:rPr lang="en-US" sz="2800" dirty="0"/>
+              <a:t>Meaning of the forms:</a:t>
+            </a:r>
+          </a:p>
+        </p:txBody>
+      </p:sp>
+      <p:sp>
+        <p:nvSpPr>
+          <p:cNvPr id="61" name="TextBox 60">
+            <a:extLst>
+              <a:ext uri="{FF2B5EF4-FFF2-40B4-BE49-F238E27FC236}">
+                <a16:creationId xmlns:a16="http://schemas.microsoft.com/office/drawing/2014/main" id="{2140E2AF-80E2-C81E-466E-86CAC10987B9}"/>
+              </a:ext>
+            </a:extLst>
+          </p:cNvPr>
+          <p:cNvSpPr txBox="1"/>
+          <p:nvPr/>
+        </p:nvSpPr>
+        <p:spPr>
+          <a:xfrm flipH="1">
+            <a:off x="3226193" y="7858650"/>
+            <a:ext cx="18836638" cy="523220"/>
+          </a:xfrm>
+          <a:prstGeom prst="rect">
+            <a:avLst/>
+          </a:prstGeom>
+          <a:noFill/>
+        </p:spPr>
+        <p:txBody>
+          <a:bodyPr wrap="square" rtlCol="0">
+            <a:spAutoFit/>
+          </a:bodyPr>
+          <a:lstStyle/>
+          <a:p>
+            <a:r>
+              <a:rPr lang="en-US" sz="2800" dirty="0"/>
+              <a:t>Machine Learning Pipeline. Gets raw data as input and sends notifications daily with potential deals:</a:t>
+            </a:r>
+          </a:p>
+        </p:txBody>
+      </p:sp>
+      <p:cxnSp>
+        <p:nvCxnSpPr>
+          <p:cNvPr id="63" name="Straight Connector 62">
+            <a:extLst>
+              <a:ext uri="{FF2B5EF4-FFF2-40B4-BE49-F238E27FC236}">
+                <a16:creationId xmlns:a16="http://schemas.microsoft.com/office/drawing/2014/main" id="{30E74080-A4C9-54DD-4E77-1F74B3C00060}"/>
+              </a:ext>
+            </a:extLst>
+          </p:cNvPr>
+          <p:cNvCxnSpPr/>
+          <p:nvPr/>
+        </p:nvCxnSpPr>
+        <p:spPr>
+          <a:xfrm>
+            <a:off x="9899907" y="7362092"/>
+            <a:ext cx="8528791" cy="0"/>
+          </a:xfrm>
+          <a:prstGeom prst="line">
+            <a:avLst/>
+          </a:prstGeom>
+        </p:spPr>
+        <p:style>
+          <a:lnRef idx="1">
+            <a:schemeClr val="accent1"/>
+          </a:lnRef>
+          <a:fillRef idx="0">
+            <a:schemeClr val="accent1"/>
+          </a:fillRef>
+          <a:effectRef idx="0">
+            <a:schemeClr val="accent1"/>
+          </a:effectRef>
+          <a:fontRef idx="minor">
+            <a:schemeClr val="tx1"/>
+          </a:fontRef>
+        </p:style>
+      </p:cxnSp>
     </p:spTree>
     <p:extLst>
       <p:ext uri="{BB962C8B-B14F-4D97-AF65-F5344CB8AC3E}">
@@ -6632,9 +6822,9 @@
 </file>
 
 <file path=ppt/theme/theme1.xml><?xml version="1.0" encoding="utf-8"?>
-<a:theme xmlns:a="http://schemas.openxmlformats.org/drawingml/2006/main" name="Office Theme">
+<a:theme xmlns:a="http://schemas.openxmlformats.org/drawingml/2006/main" name="Office 2013 - 2022 Theme">
   <a:themeElements>
-    <a:clrScheme name="Office Theme">
+    <a:clrScheme name="Office 2013 - 2022 Theme">
       <a:dk1>
         <a:sysClr val="windowText" lastClr="000000"/>
       </a:dk1>
@@ -6672,7 +6862,7 @@
         <a:srgbClr val="954F72"/>
       </a:folHlink>
     </a:clrScheme>
-    <a:fontScheme name="Office Theme">
+    <a:fontScheme name="Office 2013 - 2022 Theme">
       <a:majorFont>
         <a:latin typeface="Calibri Light" panose="020F0302020204030204"/>
         <a:ea typeface=""/>
@@ -6744,7 +6934,7 @@
         <a:font script="Geor" typeface="Sylfaen"/>
       </a:minorFont>
     </a:fontScheme>
-    <a:fmtScheme name="Office Theme">
+    <a:fmtScheme name="Office 2013 - 2022 Theme">
       <a:fillStyleLst>
         <a:solidFill>
           <a:schemeClr val="phClr"/>
@@ -6886,8 +7076,14 @@
   <a:extraClrSchemeLst/>
   <a:extLst>
     <a:ext uri="{05A4C25C-085E-4340-85A3-A5531E510DB2}">
-      <thm15:themeFamily xmlns:thm15="http://schemas.microsoft.com/office/thememl/2012/main" name="Office Theme" id="{62F939B6-93AF-4DB8-9C6B-D6C7DFDC589F}" vid="{4A3C46E8-61CC-4603-A589-7422A47A8E4A}"/>
+      <thm15:themeFamily xmlns:thm15="http://schemas.microsoft.com/office/thememl/2012/main" name="Office 2013 - 2022 Theme" id="{62F939B6-93AF-4DB8-9C6B-D6C7DFDC589F}" vid="{4A3C46E8-61CC-4603-A589-7422A47A8E4A}"/>
     </a:ext>
   </a:extLst>
 </a:theme>
+</file>
+
+<file path=docMetadata/LabelInfo.xml><?xml version="1.0" encoding="utf-8"?>
+<clbl:labelList xmlns:clbl="http://schemas.microsoft.com/office/2020/mipLabelMetadata">
+  <clbl:label id="{75c9361e-11db-4cdb-bb28-a56c50666d3c}" enabled="1" method="Privileged" siteId="{2c518df7-6644-41f8-8350-3f75e61362ac}" contentBits="0" removed="0"/>
+</clbl:labelList>
 </file>
</xml_diff>